<commit_message>
Weitere Punkte hinzugefügt. Grundgerüst (außer Prototyp) steht
</commit_message>
<xml_diff>
--- a/Präsentation/Softwareingeneering Präse V1.pptx
+++ b/Präsentation/Softwareingeneering Präse V1.pptx
@@ -6734,29 +6734,355 @@
           <a:bodyPr/>
           <a:lstStyle/>
           <a:p>
-            <a:endParaRPr lang="en-US"/>
+            <a:r>
+              <a:rPr lang="de-DE" dirty="0" smtClean="0"/>
+              <a:t>Hard-, Soft-, </a:t>
+            </a:r>
+            <a:r>
+              <a:rPr lang="de-DE" dirty="0" err="1" smtClean="0"/>
+              <a:t>Orgware</a:t>
+            </a:r>
+            <a:endParaRPr lang="en-US" dirty="0"/>
           </a:p>
         </p:txBody>
       </p:sp>
-      <p:sp>
-        <p:nvSpPr>
-          <p:cNvPr id="3" name="Content Placeholder 2"/>
-          <p:cNvSpPr>
-            <a:spLocks noGrp="1"/>
-          </p:cNvSpPr>
-          <p:nvPr>
-            <p:ph idx="1"/>
-          </p:nvPr>
-        </p:nvSpPr>
-        <p:spPr/>
-        <p:txBody>
-          <a:bodyPr/>
-          <a:lstStyle/>
-          <a:p>
-            <a:endParaRPr lang="en-US"/>
-          </a:p>
-        </p:txBody>
-      </p:sp>
+      <p:graphicFrame>
+        <p:nvGraphicFramePr>
+          <p:cNvPr id="4" name="Table 3"/>
+          <p:cNvGraphicFramePr>
+            <a:graphicFrameLocks noGrp="1"/>
+          </p:cNvGraphicFramePr>
+          <p:nvPr>
+            <p:extLst>
+              <p:ext uri="{D42A27DB-BD31-4B8C-83A1-F6EECF244321}">
+                <p14:modId xmlns:p14="http://schemas.microsoft.com/office/powerpoint/2010/main" val="887886625"/>
+              </p:ext>
+            </p:extLst>
+          </p:nvPr>
+        </p:nvGraphicFramePr>
+        <p:xfrm>
+          <a:off x="1475656" y="1700808"/>
+          <a:ext cx="6096000" cy="2763520"/>
+        </p:xfrm>
+        <a:graphic>
+          <a:graphicData uri="http://schemas.openxmlformats.org/drawingml/2006/table">
+            <a:tbl>
+              <a:tblPr firstRow="1" bandRow="1">
+                <a:tableStyleId>{5C22544A-7EE6-4342-B048-85BDC9FD1C3A}</a:tableStyleId>
+              </a:tblPr>
+              <a:tblGrid>
+                <a:gridCol w="2032000"/>
+                <a:gridCol w="2032000"/>
+                <a:gridCol w="2032000"/>
+              </a:tblGrid>
+              <a:tr h="370840">
+                <a:tc>
+                  <a:txBody>
+                    <a:bodyPr/>
+                    <a:lstStyle/>
+                    <a:p>
+                      <a:r>
+                        <a:rPr lang="de-DE" dirty="0" smtClean="0"/>
+                        <a:t>Software</a:t>
+                      </a:r>
+                      <a:endParaRPr lang="en-US" dirty="0"/>
+                    </a:p>
+                  </a:txBody>
+                  <a:tcPr/>
+                </a:tc>
+                <a:tc>
+                  <a:txBody>
+                    <a:bodyPr/>
+                    <a:lstStyle/>
+                    <a:p>
+                      <a:r>
+                        <a:rPr lang="de-DE" dirty="0" smtClean="0"/>
+                        <a:t>Hardware</a:t>
+                      </a:r>
+                      <a:endParaRPr lang="en-US" dirty="0"/>
+                    </a:p>
+                  </a:txBody>
+                  <a:tcPr/>
+                </a:tc>
+                <a:tc>
+                  <a:txBody>
+                    <a:bodyPr/>
+                    <a:lstStyle/>
+                    <a:p>
+                      <a:r>
+                        <a:rPr lang="de-DE" dirty="0" err="1" smtClean="0"/>
+                        <a:t>Orgware</a:t>
+                      </a:r>
+                      <a:endParaRPr lang="en-US" dirty="0"/>
+                    </a:p>
+                  </a:txBody>
+                  <a:tcPr/>
+                </a:tc>
+              </a:tr>
+              <a:tr h="370840">
+                <a:tc>
+                  <a:txBody>
+                    <a:bodyPr/>
+                    <a:lstStyle/>
+                    <a:p>
+                      <a:r>
+                        <a:rPr lang="de-DE" dirty="0" smtClean="0">
+                          <a:solidFill>
+                            <a:schemeClr val="tx1"/>
+                          </a:solidFill>
+                        </a:rPr>
+                        <a:t>Windows</a:t>
+                      </a:r>
+                      <a:r>
+                        <a:rPr lang="de-DE" baseline="0" dirty="0" smtClean="0">
+                          <a:solidFill>
+                            <a:schemeClr val="tx1"/>
+                          </a:solidFill>
+                        </a:rPr>
+                        <a:t> 7, 8, 8.1</a:t>
+                      </a:r>
+                      <a:endParaRPr lang="en-US" dirty="0">
+                        <a:solidFill>
+                          <a:schemeClr val="tx1"/>
+                        </a:solidFill>
+                      </a:endParaRPr>
+                    </a:p>
+                  </a:txBody>
+                  <a:tcPr/>
+                </a:tc>
+                <a:tc>
+                  <a:txBody>
+                    <a:bodyPr/>
+                    <a:lstStyle/>
+                    <a:p>
+                      <a:r>
+                        <a:rPr lang="de-DE" dirty="0" smtClean="0"/>
+                        <a:t>Server: Mind.</a:t>
+                      </a:r>
+                      <a:r>
+                        <a:rPr lang="de-DE" baseline="0" dirty="0" smtClean="0"/>
+                        <a:t> 32 Bit</a:t>
+                      </a:r>
+                      <a:endParaRPr lang="en-US" dirty="0"/>
+                    </a:p>
+                  </a:txBody>
+                  <a:tcPr/>
+                </a:tc>
+                <a:tc>
+                  <a:txBody>
+                    <a:bodyPr/>
+                    <a:lstStyle/>
+                    <a:p>
+                      <a:r>
+                        <a:rPr lang="de-DE" dirty="0" smtClean="0"/>
+                        <a:t>Internetverbindung</a:t>
+                      </a:r>
+                      <a:endParaRPr lang="en-US" dirty="0"/>
+                    </a:p>
+                  </a:txBody>
+                  <a:tcPr/>
+                </a:tc>
+              </a:tr>
+              <a:tr h="370840">
+                <a:tc>
+                  <a:txBody>
+                    <a:bodyPr/>
+                    <a:lstStyle/>
+                    <a:p>
+                      <a:r>
+                        <a:rPr lang="de-DE" dirty="0" smtClean="0"/>
+                        <a:t>Mac</a:t>
+                      </a:r>
+                      <a:r>
+                        <a:rPr lang="de-DE" baseline="0" dirty="0" smtClean="0"/>
+                        <a:t> OS X</a:t>
+                      </a:r>
+                      <a:endParaRPr lang="en-US" dirty="0"/>
+                    </a:p>
+                  </a:txBody>
+                  <a:tcPr/>
+                </a:tc>
+                <a:tc>
+                  <a:txBody>
+                    <a:bodyPr/>
+                    <a:lstStyle/>
+                    <a:p>
+                      <a:r>
+                        <a:rPr lang="de-DE" dirty="0" smtClean="0"/>
+                        <a:t>Client: JRE muss</a:t>
+                      </a:r>
+                      <a:r>
+                        <a:rPr lang="de-DE" baseline="0" dirty="0" smtClean="0"/>
+                        <a:t> lauffähig sein</a:t>
+                      </a:r>
+                      <a:endParaRPr lang="en-US" dirty="0"/>
+                    </a:p>
+                  </a:txBody>
+                  <a:tcPr/>
+                </a:tc>
+                <a:tc>
+                  <a:txBody>
+                    <a:bodyPr/>
+                    <a:lstStyle/>
+                    <a:p>
+                      <a:r>
+                        <a:rPr lang="de-DE" dirty="0" smtClean="0"/>
+                        <a:t>Synchrone Standardleitung</a:t>
+                      </a:r>
+                      <a:endParaRPr lang="en-US" dirty="0"/>
+                    </a:p>
+                  </a:txBody>
+                  <a:tcPr/>
+                </a:tc>
+              </a:tr>
+              <a:tr h="559440">
+                <a:tc>
+                  <a:txBody>
+                    <a:bodyPr/>
+                    <a:lstStyle/>
+                    <a:p>
+                      <a:r>
+                        <a:rPr lang="de-DE" dirty="0" smtClean="0"/>
+                        <a:t>Java</a:t>
+                      </a:r>
+                      <a:r>
+                        <a:rPr lang="de-DE" baseline="0" dirty="0" smtClean="0"/>
+                        <a:t> </a:t>
+                      </a:r>
+                      <a:r>
+                        <a:rPr lang="de-DE" baseline="0" dirty="0" err="1" smtClean="0"/>
+                        <a:t>Runtime</a:t>
+                      </a:r>
+                      <a:r>
+                        <a:rPr lang="de-DE" baseline="0" dirty="0" smtClean="0"/>
+                        <a:t> </a:t>
+                      </a:r>
+                      <a:r>
+                        <a:rPr lang="de-DE" baseline="0" dirty="0" err="1" smtClean="0"/>
+                        <a:t>Environement</a:t>
+                      </a:r>
+                      <a:r>
+                        <a:rPr lang="de-DE" baseline="0" dirty="0" smtClean="0"/>
+                        <a:t> (JRE)</a:t>
+                      </a:r>
+                      <a:endParaRPr lang="en-US" dirty="0"/>
+                    </a:p>
+                  </a:txBody>
+                  <a:tcPr/>
+                </a:tc>
+                <a:tc>
+                  <a:txBody>
+                    <a:bodyPr/>
+                    <a:lstStyle/>
+                    <a:p>
+                      <a:endParaRPr lang="en-US" dirty="0"/>
+                    </a:p>
+                  </a:txBody>
+                  <a:tcPr/>
+                </a:tc>
+                <a:tc>
+                  <a:txBody>
+                    <a:bodyPr/>
+                    <a:lstStyle/>
+                    <a:p>
+                      <a:r>
+                        <a:rPr lang="de-DE" dirty="0" smtClean="0"/>
+                        <a:t>Clients:</a:t>
+                      </a:r>
+                      <a:r>
+                        <a:rPr lang="de-DE" baseline="0" dirty="0" smtClean="0"/>
+                        <a:t> 2Mbit/s</a:t>
+                      </a:r>
+                      <a:endParaRPr lang="en-US" dirty="0"/>
+                    </a:p>
+                  </a:txBody>
+                  <a:tcPr/>
+                </a:tc>
+              </a:tr>
+              <a:tr h="370840">
+                <a:tc>
+                  <a:txBody>
+                    <a:bodyPr/>
+                    <a:lstStyle/>
+                    <a:p>
+                      <a:r>
+                        <a:rPr lang="de-DE" dirty="0" smtClean="0"/>
+                        <a:t>Apache</a:t>
+                      </a:r>
+                      <a:r>
+                        <a:rPr lang="de-DE" baseline="0" dirty="0" smtClean="0"/>
+                        <a:t> </a:t>
+                      </a:r>
+                      <a:r>
+                        <a:rPr lang="de-DE" baseline="0" dirty="0" err="1" smtClean="0"/>
+                        <a:t>CouchDB</a:t>
+                      </a:r>
+                      <a:endParaRPr lang="en-US" dirty="0"/>
+                    </a:p>
+                  </a:txBody>
+                  <a:tcPr/>
+                </a:tc>
+                <a:tc>
+                  <a:txBody>
+                    <a:bodyPr/>
+                    <a:lstStyle/>
+                    <a:p>
+                      <a:endParaRPr lang="en-US"/>
+                    </a:p>
+                  </a:txBody>
+                  <a:tcPr/>
+                </a:tc>
+                <a:tc>
+                  <a:txBody>
+                    <a:bodyPr/>
+                    <a:lstStyle/>
+                    <a:p>
+                      <a:endParaRPr lang="en-US"/>
+                    </a:p>
+                  </a:txBody>
+                  <a:tcPr/>
+                </a:tc>
+              </a:tr>
+              <a:tr h="370840">
+                <a:tc>
+                  <a:txBody>
+                    <a:bodyPr/>
+                    <a:lstStyle/>
+                    <a:p>
+                      <a:r>
+                        <a:rPr lang="de-DE" dirty="0" smtClean="0"/>
+                        <a:t>Java-Programm</a:t>
+                      </a:r>
+                      <a:endParaRPr lang="en-US" dirty="0"/>
+                    </a:p>
+                  </a:txBody>
+                  <a:tcPr/>
+                </a:tc>
+                <a:tc>
+                  <a:txBody>
+                    <a:bodyPr/>
+                    <a:lstStyle/>
+                    <a:p>
+                      <a:endParaRPr lang="en-US"/>
+                    </a:p>
+                  </a:txBody>
+                  <a:tcPr/>
+                </a:tc>
+                <a:tc>
+                  <a:txBody>
+                    <a:bodyPr/>
+                    <a:lstStyle/>
+                    <a:p>
+                      <a:endParaRPr lang="en-US" dirty="0"/>
+                    </a:p>
+                  </a:txBody>
+                  <a:tcPr/>
+                </a:tc>
+              </a:tr>
+            </a:tbl>
+          </a:graphicData>
+        </a:graphic>
+      </p:graphicFrame>
     </p:spTree>
     <p:extLst>
       <p:ext uri="{BB962C8B-B14F-4D97-AF65-F5344CB8AC3E}">
@@ -7114,11 +7440,7 @@
           <a:p>
             <a:r>
               <a:rPr lang="de-DE" dirty="0" smtClean="0"/>
-              <a:t>1. </a:t>
-            </a:r>
-            <a:r>
-              <a:rPr lang="de-DE" dirty="0" smtClean="0"/>
-              <a:t>Organisatorisches</a:t>
+              <a:t>1. Organisatorisches</a:t>
             </a:r>
             <a:endParaRPr lang="en-US" dirty="0"/>
           </a:p>
@@ -7365,11 +7687,7 @@
           <a:p>
             <a:r>
               <a:rPr lang="de-DE" dirty="0" smtClean="0"/>
-              <a:t>1. Übersicht </a:t>
-            </a:r>
-            <a:r>
-              <a:rPr lang="de-DE" dirty="0" smtClean="0"/>
-              <a:t>der Funktionsweise</a:t>
+              <a:t>1. Übersicht der Funktionsweise</a:t>
             </a:r>
             <a:endParaRPr lang="en-US" dirty="0"/>
           </a:p>
@@ -7459,11 +7777,7 @@
           <a:p>
             <a:r>
               <a:rPr lang="de-DE" dirty="0" smtClean="0"/>
-              <a:t>1. Unsere </a:t>
-            </a:r>
-            <a:r>
-              <a:rPr lang="de-DE" dirty="0" smtClean="0"/>
-              <a:t>Teilaufgabe</a:t>
+              <a:t>1. Unsere Teilaufgabe</a:t>
             </a:r>
             <a:endParaRPr lang="en-US" dirty="0"/>
           </a:p>
@@ -7662,14 +7976,14 @@
           <p:nvPr>
             <p:extLst>
               <p:ext uri="{D42A27DB-BD31-4B8C-83A1-F6EECF244321}">
-                <p14:modId xmlns:p14="http://schemas.microsoft.com/office/powerpoint/2010/main" val="2918106479"/>
+                <p14:modId xmlns:p14="http://schemas.microsoft.com/office/powerpoint/2010/main" val="4032260677"/>
               </p:ext>
             </p:extLst>
           </p:nvPr>
         </p:nvGraphicFramePr>
         <p:xfrm>
           <a:off x="827583" y="1628800"/>
-          <a:ext cx="7416825" cy="3774440"/>
+          <a:ext cx="7416825" cy="3032760"/>
         </p:xfrm>
         <a:graphic>
           <a:graphicData uri="http://schemas.openxmlformats.org/drawingml/2006/table">
@@ -7960,70 +8274,6 @@
                     <a:lstStyle/>
                     <a:p>
                       <a:endParaRPr lang="en-US"/>
-                    </a:p>
-                  </a:txBody>
-                  <a:tcPr/>
-                </a:tc>
-                <a:tc>
-                  <a:txBody>
-                    <a:bodyPr/>
-                    <a:lstStyle/>
-                    <a:p>
-                      <a:endParaRPr lang="en-US"/>
-                    </a:p>
-                  </a:txBody>
-                  <a:tcPr/>
-                </a:tc>
-              </a:tr>
-              <a:tr h="370840">
-                <a:tc>
-                  <a:txBody>
-                    <a:bodyPr/>
-                    <a:lstStyle/>
-                    <a:p>
-                      <a:endParaRPr lang="en-US" dirty="0"/>
-                    </a:p>
-                  </a:txBody>
-                  <a:tcPr/>
-                </a:tc>
-                <a:tc>
-                  <a:txBody>
-                    <a:bodyPr/>
-                    <a:lstStyle/>
-                    <a:p>
-                      <a:endParaRPr lang="en-US"/>
-                    </a:p>
-                  </a:txBody>
-                  <a:tcPr/>
-                </a:tc>
-                <a:tc>
-                  <a:txBody>
-                    <a:bodyPr/>
-                    <a:lstStyle/>
-                    <a:p>
-                      <a:endParaRPr lang="en-US"/>
-                    </a:p>
-                  </a:txBody>
-                  <a:tcPr/>
-                </a:tc>
-              </a:tr>
-              <a:tr h="370840">
-                <a:tc>
-                  <a:txBody>
-                    <a:bodyPr/>
-                    <a:lstStyle/>
-                    <a:p>
-                      <a:endParaRPr lang="en-US"/>
-                    </a:p>
-                  </a:txBody>
-                  <a:tcPr/>
-                </a:tc>
-                <a:tc>
-                  <a:txBody>
-                    <a:bodyPr/>
-                    <a:lstStyle/>
-                    <a:p>
-                      <a:endParaRPr lang="en-US" dirty="0"/>
                     </a:p>
                   </a:txBody>
                   <a:tcPr/>

</xml_diff>